<commit_message>
update hw due date
</commit_message>
<xml_diff>
--- a/resources/hw/genomic-data-visualization-HW_2.pptx
+++ b/resources/hw/genomic-data-visualization-HW_2.pptx
@@ -3298,8 +3298,12 @@
           <a:lstStyle/>
           <a:p>
             <a:r>
+              <a:rPr lang="en-US"/>
+              <a:t>Due Tuesday </a:t>
+            </a:r>
+            <a:r>
               <a:rPr lang="en-US" dirty="0"/>
-              <a:t>Due Wednesday (Midnight Baltimore Time)</a:t>
+              <a:t>(Midnight Baltimore Time)</a:t>
             </a:r>
           </a:p>
         </p:txBody>
@@ -3699,17 +3703,8 @@
               <a:rPr lang="en-US" sz="1600" dirty="0">
                 <a:latin typeface="-apple-system"/>
               </a:rPr>
-              <a:t> coordinates change as you increase or decrease the </a:t>
-            </a:r>
-            <a:r>
-              <a:rPr lang="en-US" sz="1600">
-                <a:latin typeface="-apple-system"/>
-              </a:rPr>
-              <a:t>perplexity?</a:t>
-            </a:r>
-            <a:endParaRPr lang="en-US" sz="1600" dirty="0">
-              <a:latin typeface="-apple-system"/>
-            </a:endParaRPr>
+              <a:t> coordinates change as you increase or decrease the perplexity?</a:t>
+            </a:r>
           </a:p>
           <a:p>
             <a:pPr marL="0" indent="0" algn="l">

</xml_diff>